<commit_message>
Added fates of apigenin figure
</commit_message>
<xml_diff>
--- a/figures/manuscript/chemodiversity/Figure_legend.pptx
+++ b/figures/manuscript/chemodiversity/Figure_legend.pptx
@@ -258,7 +258,7 @@
           <a:p>
             <a:fld id="{F73C5C09-D881-4E8C-AF96-8FF3BC27FFB4}" type="datetimeFigureOut">
               <a:rPr lang="en-US" smtClean="0"/>
-              <a:t>1/31/2021</a:t>
+              <a:t>6/2/2021</a:t>
             </a:fld>
             <a:endParaRPr lang="en-US"/>
           </a:p>
@@ -428,7 +428,7 @@
           <a:p>
             <a:fld id="{F73C5C09-D881-4E8C-AF96-8FF3BC27FFB4}" type="datetimeFigureOut">
               <a:rPr lang="en-US" smtClean="0"/>
-              <a:t>1/31/2021</a:t>
+              <a:t>6/2/2021</a:t>
             </a:fld>
             <a:endParaRPr lang="en-US"/>
           </a:p>
@@ -608,7 +608,7 @@
           <a:p>
             <a:fld id="{F73C5C09-D881-4E8C-AF96-8FF3BC27FFB4}" type="datetimeFigureOut">
               <a:rPr lang="en-US" smtClean="0"/>
-              <a:t>1/31/2021</a:t>
+              <a:t>6/2/2021</a:t>
             </a:fld>
             <a:endParaRPr lang="en-US"/>
           </a:p>
@@ -778,7 +778,7 @@
           <a:p>
             <a:fld id="{F73C5C09-D881-4E8C-AF96-8FF3BC27FFB4}" type="datetimeFigureOut">
               <a:rPr lang="en-US" smtClean="0"/>
-              <a:t>1/31/2021</a:t>
+              <a:t>6/2/2021</a:t>
             </a:fld>
             <a:endParaRPr lang="en-US"/>
           </a:p>
@@ -1022,7 +1022,7 @@
           <a:p>
             <a:fld id="{F73C5C09-D881-4E8C-AF96-8FF3BC27FFB4}" type="datetimeFigureOut">
               <a:rPr lang="en-US" smtClean="0"/>
-              <a:t>1/31/2021</a:t>
+              <a:t>6/2/2021</a:t>
             </a:fld>
             <a:endParaRPr lang="en-US"/>
           </a:p>
@@ -1254,7 +1254,7 @@
           <a:p>
             <a:fld id="{F73C5C09-D881-4E8C-AF96-8FF3BC27FFB4}" type="datetimeFigureOut">
               <a:rPr lang="en-US" smtClean="0"/>
-              <a:t>1/31/2021</a:t>
+              <a:t>6/2/2021</a:t>
             </a:fld>
             <a:endParaRPr lang="en-US"/>
           </a:p>
@@ -1621,7 +1621,7 @@
           <a:p>
             <a:fld id="{F73C5C09-D881-4E8C-AF96-8FF3BC27FFB4}" type="datetimeFigureOut">
               <a:rPr lang="en-US" smtClean="0"/>
-              <a:t>1/31/2021</a:t>
+              <a:t>6/2/2021</a:t>
             </a:fld>
             <a:endParaRPr lang="en-US"/>
           </a:p>
@@ -1739,7 +1739,7 @@
           <a:p>
             <a:fld id="{F73C5C09-D881-4E8C-AF96-8FF3BC27FFB4}" type="datetimeFigureOut">
               <a:rPr lang="en-US" smtClean="0"/>
-              <a:t>1/31/2021</a:t>
+              <a:t>6/2/2021</a:t>
             </a:fld>
             <a:endParaRPr lang="en-US"/>
           </a:p>
@@ -1834,7 +1834,7 @@
           <a:p>
             <a:fld id="{F73C5C09-D881-4E8C-AF96-8FF3BC27FFB4}" type="datetimeFigureOut">
               <a:rPr lang="en-US" smtClean="0"/>
-              <a:t>1/31/2021</a:t>
+              <a:t>6/2/2021</a:t>
             </a:fld>
             <a:endParaRPr lang="en-US"/>
           </a:p>
@@ -2111,7 +2111,7 @@
           <a:p>
             <a:fld id="{F73C5C09-D881-4E8C-AF96-8FF3BC27FFB4}" type="datetimeFigureOut">
               <a:rPr lang="en-US" smtClean="0"/>
-              <a:t>1/31/2021</a:t>
+              <a:t>6/2/2021</a:t>
             </a:fld>
             <a:endParaRPr lang="en-US"/>
           </a:p>
@@ -2367,7 +2367,7 @@
           <a:p>
             <a:fld id="{F73C5C09-D881-4E8C-AF96-8FF3BC27FFB4}" type="datetimeFigureOut">
               <a:rPr lang="en-US" smtClean="0"/>
-              <a:t>1/31/2021</a:t>
+              <a:t>6/2/2021</a:t>
             </a:fld>
             <a:endParaRPr lang="en-US"/>
           </a:p>
@@ -2580,7 +2580,7 @@
           <a:p>
             <a:fld id="{F73C5C09-D881-4E8C-AF96-8FF3BC27FFB4}" type="datetimeFigureOut">
               <a:rPr lang="en-US" smtClean="0"/>
-              <a:t>1/31/2021</a:t>
+              <a:t>6/2/2021</a:t>
             </a:fld>
             <a:endParaRPr lang="en-US"/>
           </a:p>
@@ -3468,21 +3468,7 @@
                 <a:latin typeface="Arial" panose="020B0604020202020204" pitchFamily="34" charset="0"/>
                 <a:cs typeface="Arial" panose="020B0604020202020204" pitchFamily="34" charset="0"/>
               </a:rPr>
-              <a:t>species via High Performance Liquid Chromatography (HPLC). Samples were taken in biological triplicate, and the average concentration of each metabolite calculated. Species on x-axis are ordered based on phylogenetic relationship determined from chloroplast genome data, and colored circles next to species names indicate phylogenetic clade, as shown </a:t>
-            </a:r>
-            <a:r>
-              <a:rPr lang="en-US" sz="1000">
-                <a:latin typeface="Arial" panose="020B0604020202020204" pitchFamily="34" charset="0"/>
-                <a:cs typeface="Arial" panose="020B0604020202020204" pitchFamily="34" charset="0"/>
-              </a:rPr>
-              <a:t>in Fig. </a:t>
-            </a:r>
-            <a:r>
-              <a:rPr lang="en-US" sz="1000" dirty="0">
-                <a:latin typeface="Arial" panose="020B0604020202020204" pitchFamily="34" charset="0"/>
-                <a:cs typeface="Arial" panose="020B0604020202020204" pitchFamily="34" charset="0"/>
-              </a:rPr>
-              <a:t>1. An empty circle indicates that the species was not included in the tree from Fig. 1.</a:t>
+              <a:t>species via High Performance Liquid Chromatography (HPLC). Samples were taken in biological triplicate, and the average concentration of each metabolite calculated. Species on x-axis are ordered based on phylogenetic relationship determined from chloroplast genome data, and colored circles next to species names indicate phylogenetic clade, as shown in Fig. 1. An empty circle indicates that the species was not included in the tree from Fig. 1.</a:t>
             </a:r>
             <a:endParaRPr lang="en-US" sz="1000" b="1" dirty="0">
               <a:latin typeface="Arial" panose="020B0604020202020204" pitchFamily="34" charset="0"/>

</xml_diff>